<commit_message>
Update final project files
</commit_message>
<xml_diff>
--- a/Final-capstone-story-project.pptx
+++ b/Final-capstone-story-project.pptx
@@ -164,7 +164,7 @@
 <p1510:revInfo xmlns:a="http://schemas.openxmlformats.org/drawingml/2006/main" xmlns:r="http://schemas.openxmlformats.org/officeDocument/2006/relationships" xmlns:p1510="http://schemas.microsoft.com/office/powerpoint/2015/10/main">
   <p1510:revLst>
     <p1510:client id="{312DA8FB-4A95-74AF-B54E-9BCC47861837}" v="346" dt="2024-04-04T18:43:46.041"/>
-    <p1510:client id="{3D71CE86-26CF-7C8D-4D86-759BE4799E4F}" v="46" dt="2024-04-04T20:51:04.182"/>
+    <p1510:client id="{3D71CE86-26CF-7C8D-4D86-759BE4799E4F}" v="51" dt="2024-04-04T21:11:06.251"/>
     <p1510:client id="{ED7C38CB-1E79-A594-77C6-6E404690D87E}" v="185" dt="2024-04-03T18:24:48.875"/>
   </p1510:revLst>
 </p1510:revInfo>
@@ -9028,23 +9028,15 @@
             </a:r>
           </a:p>
           <a:p>
-            <a:r>
-              <a:rPr lang="en-US" sz="2200" dirty="0">
-                <a:latin typeface="IBM Plex Mono Text"/>
-              </a:rPr>
-              <a:t>Point3</a:t>
-            </a:r>
-          </a:p>
-          <a:p>
             <a:pPr lvl="1"/>
             <a:r>
-              <a:rPr lang="en-US" sz="1800">
+              <a:rPr lang="en-US" sz="1800" dirty="0">
                 <a:latin typeface="Arial"/>
                 <a:cs typeface="Arial"/>
               </a:rPr>
               <a:t>What is the most used programming language today?</a:t>
             </a:r>
-            <a:endParaRPr lang="en-US" sz="1800">
+            <a:endParaRPr lang="en-US" sz="1800" dirty="0">
               <a:solidFill>
                 <a:srgbClr val="000000"/>
               </a:solidFill>

</xml_diff>